<commit_message>
Video part 1 ls 6
</commit_message>
<xml_diff>
--- a/lesson 7/Lesson_7.pptx
+++ b/lesson 7/Lesson_7.pptx
@@ -5,7 +5,7 @@
     <p:sldMasterId id="2147483648" r:id="rId1"/>
   </p:sldMasterIdLst>
   <p:notesMasterIdLst>
-    <p:notesMasterId r:id="rId10"/>
+    <p:notesMasterId r:id="rId11"/>
   </p:notesMasterIdLst>
   <p:sldIdLst>
     <p:sldId id="256" r:id="rId2"/>
@@ -13,9 +13,10 @@
     <p:sldId id="266" r:id="rId4"/>
     <p:sldId id="276" r:id="rId5"/>
     <p:sldId id="265" r:id="rId6"/>
-    <p:sldId id="282" r:id="rId7"/>
-    <p:sldId id="283" r:id="rId8"/>
-    <p:sldId id="274" r:id="rId9"/>
+    <p:sldId id="284" r:id="rId7"/>
+    <p:sldId id="282" r:id="rId8"/>
+    <p:sldId id="283" r:id="rId9"/>
+    <p:sldId id="274" r:id="rId10"/>
   </p:sldIdLst>
   <p:sldSz cx="12192000" cy="6858000"/>
   <p:notesSz cx="6858000" cy="9144000"/>
@@ -128,7 +129,8 @@
     <p1510:client id="{0C6B8EF6-F8A4-7AB8-7F88-BD27EDEFE434}" v="2" dt="2021-12-02T05:38:51.155"/>
     <p1510:client id="{14D01024-C9C5-DA47-B5B3-F55C2D2478EC}" v="190" dt="2021-12-09T08:20:30.219"/>
     <p1510:client id="{1D00F415-21C9-126B-D811-EECC4BD1021F}" v="336" dt="2021-12-08T16:55:26.595"/>
-    <p1510:client id="{3AE1814E-29CF-098E-6F63-66198B5ED3F9}" v="1220" dt="2021-12-09T10:33:36.255"/>
+    <p1510:client id="{35AAA831-2A0B-9B0F-7EFA-DC1609378AD5}" v="118" dt="2021-12-09T10:45:05.636"/>
+    <p1510:client id="{3AE1814E-29CF-098E-6F63-66198B5ED3F9}" v="1226" dt="2021-12-09T10:42:43.371"/>
     <p1510:client id="{58A5EECA-69F4-A2C6-FD0E-DB58BAABE3E1}" v="170" dt="2021-12-08T11:52:11.015"/>
     <p1510:client id="{8D6854E7-4F17-FE40-59D2-55336647B245}" v="392" dt="2021-12-08T17:31:06.388"/>
     <p1510:client id="{9BFC776D-9240-A62B-7277-02C9E30D22CA}" v="479" dt="2021-12-08T17:59:18.181"/>
@@ -7450,6 +7452,557 @@
                 </a:solidFill>
                 <a:cs typeface="Calibri"/>
               </a:rPr>
+              <a:t>Методы объектов</a:t>
+            </a:r>
+            <a:endParaRPr lang="en-US" dirty="0"/>
+          </a:p>
+        </p:txBody>
+      </p:sp>
+      <p:pic>
+        <p:nvPicPr>
+          <p:cNvPr id="4" name="Picture 4">
+            <a:extLst>
+              <a:ext uri="{FF2B5EF4-FFF2-40B4-BE49-F238E27FC236}">
+                <a16:creationId xmlns:a16="http://schemas.microsoft.com/office/drawing/2014/main" id="{D80F2A24-BB4B-4507-A4D9-BFF2A3A54804}"/>
+              </a:ext>
+            </a:extLst>
+          </p:cNvPr>
+          <p:cNvPicPr>
+            <a:picLocks noChangeAspect="1"/>
+          </p:cNvPicPr>
+          <p:nvPr/>
+        </p:nvPicPr>
+        <p:blipFill>
+          <a:blip r:embed="rId2"/>
+          <a:stretch>
+            <a:fillRect/>
+          </a:stretch>
+        </p:blipFill>
+        <p:spPr>
+          <a:xfrm>
+            <a:off x="1126603" y="2148830"/>
+            <a:ext cx="5328211" cy="1595782"/>
+          </a:xfrm>
+          <a:prstGeom prst="rect">
+            <a:avLst/>
+          </a:prstGeom>
+        </p:spPr>
+      </p:pic>
+      <p:pic>
+        <p:nvPicPr>
+          <p:cNvPr id="5" name="Picture 5">
+            <a:extLst>
+              <a:ext uri="{FF2B5EF4-FFF2-40B4-BE49-F238E27FC236}">
+                <a16:creationId xmlns:a16="http://schemas.microsoft.com/office/drawing/2014/main" id="{7D497A83-0D07-43AC-9E0D-4C3B8CFDF781}"/>
+              </a:ext>
+            </a:extLst>
+          </p:cNvPr>
+          <p:cNvPicPr>
+            <a:picLocks noChangeAspect="1"/>
+          </p:cNvPicPr>
+          <p:nvPr/>
+        </p:nvPicPr>
+        <p:blipFill>
+          <a:blip r:embed="rId3"/>
+          <a:stretch>
+            <a:fillRect/>
+          </a:stretch>
+        </p:blipFill>
+        <p:spPr>
+          <a:xfrm>
+            <a:off x="1338805" y="5127651"/>
+            <a:ext cx="4141807" cy="750292"/>
+          </a:xfrm>
+          <a:prstGeom prst="rect">
+            <a:avLst/>
+          </a:prstGeom>
+        </p:spPr>
+      </p:pic>
+      <p:sp>
+        <p:nvSpPr>
+          <p:cNvPr id="7" name="TextBox 6">
+            <a:extLst>
+              <a:ext uri="{FF2B5EF4-FFF2-40B4-BE49-F238E27FC236}">
+                <a16:creationId xmlns:a16="http://schemas.microsoft.com/office/drawing/2014/main" id="{9E563B2B-A867-4395-AEDC-12236EADC6E9}"/>
+              </a:ext>
+            </a:extLst>
+          </p:cNvPr>
+          <p:cNvSpPr txBox="1"/>
+          <p:nvPr/>
+        </p:nvSpPr>
+        <p:spPr>
+          <a:xfrm>
+            <a:off x="625651" y="4466319"/>
+            <a:ext cx="3300045" cy="369332"/>
+          </a:xfrm>
+          <a:prstGeom prst="rect">
+            <a:avLst/>
+          </a:prstGeom>
+          <a:noFill/>
+        </p:spPr>
+        <p:txBody>
+          <a:bodyPr rot="0" spcFirstLastPara="0" vertOverflow="overflow" horzOverflow="overflow" vert="horz" wrap="square" lIns="91440" tIns="45720" rIns="91440" bIns="45720" numCol="1" spcCol="0" rtlCol="0" fromWordArt="0" anchor="t" anchorCtr="0" forceAA="0" compatLnSpc="1">
+            <a:prstTxWarp prst="textNoShape">
+              <a:avLst/>
+            </a:prstTxWarp>
+            <a:spAutoFit/>
+          </a:bodyPr>
+          <a:lstStyle/>
+          <a:p>
+            <a:r>
+              <a:rPr lang="en-US" b="1" dirty="0" err="1"/>
+              <a:t>Вывод</a:t>
+            </a:r>
+            <a:r>
+              <a:rPr lang="en-US" b="1" dirty="0"/>
+              <a:t>:</a:t>
+            </a:r>
+            <a:endParaRPr lang="en-US" dirty="0"/>
+          </a:p>
+        </p:txBody>
+      </p:sp>
+      <p:sp>
+        <p:nvSpPr>
+          <p:cNvPr id="8" name="TextBox 7">
+            <a:extLst>
+              <a:ext uri="{FF2B5EF4-FFF2-40B4-BE49-F238E27FC236}">
+                <a16:creationId xmlns:a16="http://schemas.microsoft.com/office/drawing/2014/main" id="{B7D35D61-5E53-475C-A6B5-ED712242C129}"/>
+              </a:ext>
+            </a:extLst>
+          </p:cNvPr>
+          <p:cNvSpPr txBox="1"/>
+          <p:nvPr/>
+        </p:nvSpPr>
+        <p:spPr>
+          <a:xfrm>
+            <a:off x="625650" y="1485837"/>
+            <a:ext cx="4283893" cy="369332"/>
+          </a:xfrm>
+          <a:prstGeom prst="rect">
+            <a:avLst/>
+          </a:prstGeom>
+          <a:noFill/>
+        </p:spPr>
+        <p:txBody>
+          <a:bodyPr rot="0" spcFirstLastPara="0" vertOverflow="overflow" horzOverflow="overflow" vert="horz" wrap="square" lIns="91440" tIns="45720" rIns="91440" bIns="45720" numCol="1" spcCol="0" rtlCol="0" fromWordArt="0" anchor="t" anchorCtr="0" forceAA="0" compatLnSpc="1">
+            <a:prstTxWarp prst="textNoShape">
+              <a:avLst/>
+            </a:prstTxWarp>
+            <a:spAutoFit/>
+          </a:bodyPr>
+          <a:lstStyle/>
+          <a:p>
+            <a:r>
+              <a:rPr lang="en-US" b="1" dirty="0" err="1"/>
+              <a:t>Добавим</a:t>
+            </a:r>
+            <a:r>
+              <a:rPr lang="en-US" b="1" dirty="0"/>
+              <a:t> </a:t>
+            </a:r>
+            <a:r>
+              <a:rPr lang="en-US" b="1" dirty="0" err="1"/>
+              <a:t>метод</a:t>
+            </a:r>
+            <a:r>
+              <a:rPr lang="en-US" b="1" dirty="0"/>
+              <a:t> </a:t>
+            </a:r>
+            <a:r>
+              <a:rPr lang="en-US" b="1" dirty="0" err="1"/>
+              <a:t>get_work_mode</a:t>
+            </a:r>
+            <a:r>
+              <a:rPr lang="en-US" b="1" dirty="0"/>
+              <a:t>():</a:t>
+            </a:r>
+            <a:endParaRPr lang="en-US" dirty="0"/>
+          </a:p>
+        </p:txBody>
+      </p:sp>
+      <p:sp>
+        <p:nvSpPr>
+          <p:cNvPr id="10" name="Rectangle: Rounded Corners 9">
+            <a:extLst>
+              <a:ext uri="{FF2B5EF4-FFF2-40B4-BE49-F238E27FC236}">
+                <a16:creationId xmlns:a16="http://schemas.microsoft.com/office/drawing/2014/main" id="{D3F0D205-16F8-44E0-A5A4-74B17F1E76A5}"/>
+              </a:ext>
+            </a:extLst>
+          </p:cNvPr>
+          <p:cNvSpPr/>
+          <p:nvPr/>
+        </p:nvSpPr>
+        <p:spPr>
+          <a:xfrm>
+            <a:off x="7680680" y="2530366"/>
+            <a:ext cx="3699447" cy="2097785"/>
+          </a:xfrm>
+          <a:prstGeom prst="roundRect">
+            <a:avLst/>
+          </a:prstGeom>
+        </p:spPr>
+        <p:style>
+          <a:lnRef idx="2">
+            <a:schemeClr val="accent1">
+              <a:shade val="50000"/>
+            </a:schemeClr>
+          </a:lnRef>
+          <a:fillRef idx="1">
+            <a:schemeClr val="accent1"/>
+          </a:fillRef>
+          <a:effectRef idx="0">
+            <a:schemeClr val="accent1"/>
+          </a:effectRef>
+          <a:fontRef idx="minor">
+            <a:schemeClr val="lt1"/>
+          </a:fontRef>
+        </p:style>
+        <p:txBody>
+          <a:bodyPr lIns="91440" tIns="45720" rIns="91440" bIns="45720" rtlCol="0" anchor="ctr"/>
+          <a:lstStyle/>
+          <a:p>
+            <a:r>
+              <a:rPr lang="en-US" b="1" dirty="0">
+                <a:solidFill>
+                  <a:srgbClr val="FFC000"/>
+                </a:solidFill>
+                <a:ea typeface="+mn-lt"/>
+                <a:cs typeface="+mn-lt"/>
+              </a:rPr>
+              <a:t>       </a:t>
+            </a:r>
+            <a:r>
+              <a:rPr lang="en-US" b="1" dirty="0" err="1">
+                <a:solidFill>
+                  <a:srgbClr val="FFC000"/>
+                </a:solidFill>
+                <a:ea typeface="+mn-lt"/>
+                <a:cs typeface="+mn-lt"/>
+              </a:rPr>
+              <a:t>Методы</a:t>
+            </a:r>
+            <a:r>
+              <a:rPr lang="en-US" dirty="0">
+                <a:ea typeface="+mn-lt"/>
+                <a:cs typeface="+mn-lt"/>
+              </a:rPr>
+              <a:t>  - </a:t>
+            </a:r>
+            <a:r>
+              <a:rPr lang="en-US" dirty="0" err="1">
+                <a:ea typeface="+mn-lt"/>
+                <a:cs typeface="+mn-lt"/>
+              </a:rPr>
+              <a:t>описывают</a:t>
+            </a:r>
+            <a:r>
+              <a:rPr lang="en-US" dirty="0">
+                <a:ea typeface="+mn-lt"/>
+                <a:cs typeface="+mn-lt"/>
+              </a:rPr>
+              <a:t> </a:t>
+            </a:r>
+            <a:r>
+              <a:rPr lang="en-US" dirty="0" err="1">
+                <a:ea typeface="+mn-lt"/>
+                <a:cs typeface="+mn-lt"/>
+              </a:rPr>
+              <a:t>поведение</a:t>
+            </a:r>
+            <a:r>
+              <a:rPr lang="en-US" dirty="0">
+                <a:ea typeface="+mn-lt"/>
+                <a:cs typeface="+mn-lt"/>
+              </a:rPr>
+              <a:t> </a:t>
+            </a:r>
+            <a:r>
+              <a:rPr lang="en-US" dirty="0" err="1">
+                <a:ea typeface="+mn-lt"/>
+                <a:cs typeface="+mn-lt"/>
+              </a:rPr>
+              <a:t>классов</a:t>
+            </a:r>
+            <a:r>
+              <a:rPr lang="en-US" dirty="0">
+                <a:ea typeface="+mn-lt"/>
+                <a:cs typeface="+mn-lt"/>
+              </a:rPr>
+              <a:t>. </a:t>
+            </a:r>
+            <a:r>
+              <a:rPr lang="en-US" dirty="0" err="1">
+                <a:ea typeface="+mn-lt"/>
+                <a:cs typeface="+mn-lt"/>
+              </a:rPr>
+              <a:t>Так</a:t>
+            </a:r>
+            <a:r>
+              <a:rPr lang="en-US" dirty="0">
+                <a:ea typeface="+mn-lt"/>
+                <a:cs typeface="+mn-lt"/>
+              </a:rPr>
+              <a:t> </a:t>
+            </a:r>
+            <a:r>
+              <a:rPr lang="en-US" dirty="0" err="1">
+                <a:ea typeface="+mn-lt"/>
+                <a:cs typeface="+mn-lt"/>
+              </a:rPr>
+              <a:t>же</a:t>
+            </a:r>
+            <a:r>
+              <a:rPr lang="en-US" dirty="0">
+                <a:ea typeface="+mn-lt"/>
+                <a:cs typeface="+mn-lt"/>
+              </a:rPr>
+              <a:t> </a:t>
+            </a:r>
+            <a:r>
+              <a:rPr lang="en-US" dirty="0" err="1">
+                <a:ea typeface="+mn-lt"/>
+                <a:cs typeface="+mn-lt"/>
+              </a:rPr>
+              <a:t>как</a:t>
+            </a:r>
+            <a:r>
+              <a:rPr lang="en-US" dirty="0">
+                <a:ea typeface="+mn-lt"/>
+                <a:cs typeface="+mn-lt"/>
+              </a:rPr>
+              <a:t> и </a:t>
+            </a:r>
+            <a:r>
+              <a:rPr lang="en-US" dirty="0" err="1">
+                <a:ea typeface="+mn-lt"/>
+                <a:cs typeface="+mn-lt"/>
+              </a:rPr>
+              <a:t>функции</a:t>
+            </a:r>
+            <a:r>
+              <a:rPr lang="en-US" dirty="0">
+                <a:ea typeface="+mn-lt"/>
+                <a:cs typeface="+mn-lt"/>
+              </a:rPr>
+              <a:t> </a:t>
+            </a:r>
+            <a:r>
+              <a:rPr lang="en-US" dirty="0" err="1">
+                <a:ea typeface="+mn-lt"/>
+                <a:cs typeface="+mn-lt"/>
+              </a:rPr>
+              <a:t>могут</a:t>
+            </a:r>
+            <a:r>
+              <a:rPr lang="en-US" dirty="0">
+                <a:ea typeface="+mn-lt"/>
+                <a:cs typeface="+mn-lt"/>
+              </a:rPr>
+              <a:t> </a:t>
+            </a:r>
+            <a:r>
+              <a:rPr lang="en-US" dirty="0" err="1">
+                <a:ea typeface="+mn-lt"/>
+                <a:cs typeface="+mn-lt"/>
+              </a:rPr>
+              <a:t>принимать</a:t>
+            </a:r>
+            <a:r>
+              <a:rPr lang="en-US" dirty="0">
+                <a:ea typeface="+mn-lt"/>
+                <a:cs typeface="+mn-lt"/>
+              </a:rPr>
+              <a:t> </a:t>
+            </a:r>
+            <a:r>
+              <a:rPr lang="en-US" dirty="0" err="1">
+                <a:ea typeface="+mn-lt"/>
+                <a:cs typeface="+mn-lt"/>
+              </a:rPr>
+              <a:t>параметры</a:t>
+            </a:r>
+            <a:r>
+              <a:rPr lang="en-US" dirty="0">
+                <a:ea typeface="+mn-lt"/>
+                <a:cs typeface="+mn-lt"/>
+              </a:rPr>
+              <a:t> и </a:t>
+            </a:r>
+            <a:r>
+              <a:rPr lang="en-US" dirty="0" err="1">
+                <a:ea typeface="+mn-lt"/>
+                <a:cs typeface="+mn-lt"/>
+              </a:rPr>
+              <a:t>возвращать</a:t>
+            </a:r>
+            <a:r>
+              <a:rPr lang="en-US" dirty="0">
+                <a:ea typeface="+mn-lt"/>
+                <a:cs typeface="+mn-lt"/>
+              </a:rPr>
+              <a:t> </a:t>
+            </a:r>
+            <a:r>
+              <a:rPr lang="en-US" dirty="0" err="1">
+                <a:ea typeface="+mn-lt"/>
+                <a:cs typeface="+mn-lt"/>
+              </a:rPr>
+              <a:t>значения</a:t>
+            </a:r>
+            <a:r>
+              <a:rPr lang="en-US" dirty="0">
+                <a:ea typeface="+mn-lt"/>
+                <a:cs typeface="+mn-lt"/>
+              </a:rPr>
+              <a:t>. </a:t>
+            </a:r>
+            <a:r>
+              <a:rPr lang="en-US" dirty="0" err="1">
+                <a:ea typeface="+mn-lt"/>
+                <a:cs typeface="+mn-lt"/>
+              </a:rPr>
+              <a:t>Вызываются</a:t>
+            </a:r>
+            <a:r>
+              <a:rPr lang="en-US" dirty="0">
+                <a:ea typeface="+mn-lt"/>
+                <a:cs typeface="+mn-lt"/>
+              </a:rPr>
+              <a:t> </a:t>
+            </a:r>
+            <a:r>
+              <a:rPr lang="en-US" dirty="0" err="1">
+                <a:ea typeface="+mn-lt"/>
+                <a:cs typeface="+mn-lt"/>
+              </a:rPr>
+              <a:t>относительно</a:t>
+            </a:r>
+            <a:r>
+              <a:rPr lang="en-US" dirty="0">
+                <a:ea typeface="+mn-lt"/>
+                <a:cs typeface="+mn-lt"/>
+              </a:rPr>
+              <a:t> </a:t>
+            </a:r>
+            <a:r>
+              <a:rPr lang="en-US" dirty="0" err="1">
+                <a:ea typeface="+mn-lt"/>
+                <a:cs typeface="+mn-lt"/>
+              </a:rPr>
+              <a:t>какого-то</a:t>
+            </a:r>
+            <a:r>
+              <a:rPr lang="en-US" dirty="0">
+                <a:ea typeface="+mn-lt"/>
+                <a:cs typeface="+mn-lt"/>
+              </a:rPr>
+              <a:t> </a:t>
+            </a:r>
+            <a:r>
+              <a:rPr lang="en-US" dirty="0" err="1">
+                <a:ea typeface="+mn-lt"/>
+                <a:cs typeface="+mn-lt"/>
+              </a:rPr>
+              <a:t>объекта</a:t>
+            </a:r>
+            <a:r>
+              <a:rPr lang="en-US" dirty="0">
+                <a:ea typeface="+mn-lt"/>
+                <a:cs typeface="+mn-lt"/>
+              </a:rPr>
+              <a:t> </a:t>
+            </a:r>
+            <a:endParaRPr lang="en-US" dirty="0">
+              <a:cs typeface="Calibri" panose="020F0502020204030204"/>
+            </a:endParaRPr>
+          </a:p>
+        </p:txBody>
+      </p:sp>
+    </p:spTree>
+    <p:extLst>
+      <p:ext uri="{BB962C8B-B14F-4D97-AF65-F5344CB8AC3E}">
+        <p14:creationId xmlns:p14="http://schemas.microsoft.com/office/powerpoint/2010/main" val="3636934865"/>
+      </p:ext>
+    </p:extLst>
+  </p:cSld>
+  <p:clrMapOvr>
+    <a:masterClrMapping/>
+  </p:clrMapOvr>
+</p:sld>
+</file>
+
+<file path=ppt/slides/slide7.xml><?xml version="1.0" encoding="utf-8"?>
+<p:sld xmlns:a="http://schemas.openxmlformats.org/drawingml/2006/main" xmlns:r="http://schemas.openxmlformats.org/officeDocument/2006/relationships" xmlns:p="http://schemas.openxmlformats.org/presentationml/2006/main">
+  <p:cSld>
+    <p:spTree>
+      <p:nvGrpSpPr>
+        <p:cNvPr id="1" name=""/>
+        <p:cNvGrpSpPr/>
+        <p:nvPr/>
+      </p:nvGrpSpPr>
+      <p:grpSpPr>
+        <a:xfrm>
+          <a:off x="0" y="0"/>
+          <a:ext cx="0" cy="0"/>
+          <a:chOff x="0" y="0"/>
+          <a:chExt cx="0" cy="0"/>
+        </a:xfrm>
+      </p:grpSpPr>
+      <p:sp>
+        <p:nvSpPr>
+          <p:cNvPr id="3" name="Прямоугольник 4">
+            <a:extLst>
+              <a:ext uri="{FF2B5EF4-FFF2-40B4-BE49-F238E27FC236}">
+                <a16:creationId xmlns:a16="http://schemas.microsoft.com/office/drawing/2014/main" id="{E18833D8-4A15-461E-A767-C95346D8F319}"/>
+              </a:ext>
+            </a:extLst>
+          </p:cNvPr>
+          <p:cNvSpPr/>
+          <p:nvPr/>
+        </p:nvSpPr>
+        <p:spPr>
+          <a:xfrm>
+            <a:off x="569167" y="242596"/>
+            <a:ext cx="11150082" cy="811763"/>
+          </a:xfrm>
+          <a:prstGeom prst="rect">
+            <a:avLst/>
+          </a:prstGeom>
+        </p:spPr>
+        <p:style>
+          <a:lnRef idx="2">
+            <a:schemeClr val="accent1">
+              <a:shade val="50000"/>
+            </a:schemeClr>
+          </a:lnRef>
+          <a:fillRef idx="1">
+            <a:schemeClr val="accent1"/>
+          </a:fillRef>
+          <a:effectRef idx="0">
+            <a:schemeClr val="accent1"/>
+          </a:effectRef>
+          <a:fontRef idx="minor">
+            <a:schemeClr val="lt1"/>
+          </a:fontRef>
+        </p:style>
+        <p:txBody>
+          <a:bodyPr lIns="91440" tIns="45720" rIns="91440" bIns="45720" rtlCol="0" anchor="ctr"/>
+          <a:lstStyle/>
+          <a:p>
+            <a:pPr algn="ctr"/>
+            <a:r>
+              <a:rPr lang="ru-RU" sz="3200" b="1" dirty="0">
+                <a:ln w="12700" cmpd="sng">
+                  <a:solidFill>
+                    <a:srgbClr val="FFC000"/>
+                  </a:solidFill>
+                  <a:prstDash val="solid"/>
+                </a:ln>
+                <a:solidFill>
+                  <a:srgbClr val="FFC000"/>
+                </a:solidFill>
+                <a:cs typeface="Calibri"/>
+              </a:rPr>
               <a:t>Метод __</a:t>
             </a:r>
             <a:r>
@@ -8138,7 +8691,7 @@
 </p:sld>
 </file>
 
-<file path=ppt/slides/slide7.xml><?xml version="1.0" encoding="utf-8"?>
+<file path=ppt/slides/slide8.xml><?xml version="1.0" encoding="utf-8"?>
 <p:sld xmlns:a="http://schemas.openxmlformats.org/drawingml/2006/main" xmlns:r="http://schemas.openxmlformats.org/officeDocument/2006/relationships" xmlns:p="http://schemas.openxmlformats.org/presentationml/2006/main">
   <p:cSld>
     <p:spTree>
@@ -9283,7 +9836,7 @@
 </p:sld>
 </file>
 
-<file path=ppt/slides/slide8.xml><?xml version="1.0" encoding="utf-8"?>
+<file path=ppt/slides/slide9.xml><?xml version="1.0" encoding="utf-8"?>
 <p:sld xmlns:a="http://schemas.openxmlformats.org/drawingml/2006/main" xmlns:r="http://schemas.openxmlformats.org/officeDocument/2006/relationships" xmlns:p="http://schemas.openxmlformats.org/presentationml/2006/main">
   <p:cSld>
     <p:spTree>

</xml_diff>